<commit_message>
Production doc builds - 2021/02/18 15:18:46 UTC
</commit_message>
<xml_diff>
--- a/docs/images/new-relic-architecture-diagram.pptx
+++ b/docs/images/new-relic-architecture-diagram.pptx
@@ -5631,8 +5631,8 @@
         </p:nvSpPr>
         <p:spPr>
           <a:xfrm>
-            <a:off x="2835772" y="1436199"/>
-            <a:ext cx="999000" cy="171300"/>
+            <a:off x="2815965" y="1272389"/>
+            <a:ext cx="1043390" cy="171300"/>
           </a:xfrm>
           <a:prstGeom prst="rect">
             <a:avLst/>
@@ -5650,8 +5650,8 @@
           <a:p>
             <a:pPr algn="ctr"/>
             <a:r>
-              <a:rPr lang="en" sz="1200" dirty="0"/>
-              <a:t>Instance ID</a:t>
+              <a:rPr lang="en-US" sz="1200" dirty="0" smtClean="0"/>
+              <a:t>Filter instance tag</a:t>
             </a:r>
             <a:endParaRPr sz="1200" dirty="0"/>
           </a:p>
@@ -5666,7 +5666,7 @@
         <p:spPr>
           <a:xfrm>
             <a:off x="4534000" y="1252858"/>
-            <a:ext cx="988537" cy="171300"/>
+            <a:ext cx="1022999" cy="171300"/>
           </a:xfrm>
           <a:prstGeom prst="rect">
             <a:avLst/>
@@ -5684,15 +5684,8 @@
           <a:p>
             <a:pPr algn="ctr"/>
             <a:r>
-              <a:rPr lang="en" sz="1200" dirty="0"/>
-              <a:t>Instance </a:t>
-            </a:r>
-            <a:br>
-              <a:rPr lang="en" sz="1200" dirty="0"/>
-            </a:br>
-            <a:r>
-              <a:rPr lang="en" sz="1200" dirty="0"/>
-              <a:t>tag match</a:t>
+              <a:rPr lang="en" sz="1200" dirty="0" smtClean="0"/>
+              <a:t>Match instance tag</a:t>
             </a:r>
             <a:endParaRPr sz="1200" dirty="0"/>
           </a:p>
@@ -5873,7 +5866,7 @@
         <p:spPr>
           <a:xfrm>
             <a:off x="429938" y="125607"/>
-            <a:ext cx="9196662" cy="3984431"/>
+            <a:ext cx="9266512" cy="3984431"/>
           </a:xfrm>
           <a:prstGeom prst="rect">
             <a:avLst/>
@@ -6010,7 +6003,7 @@
         </p:blipFill>
         <p:spPr bwMode="auto">
           <a:xfrm>
-            <a:off x="7049563" y="1524398"/>
+            <a:off x="7194947" y="1526485"/>
             <a:ext cx="469900" cy="469900"/>
           </a:xfrm>
           <a:prstGeom prst="rect">
@@ -6342,8 +6335,17 @@
           <p:nvPr/>
         </p:nvPicPr>
         <p:blipFill>
-          <a:blip r:embed="rId6">
+          <a:blip r:embed="rId7">
             <a:extLst>
+              <a:ext uri="{BEBA8EAE-BF5A-486C-A8C5-ECC9F3942E4B}">
+                <a14:imgProps xmlns:a14="http://schemas.microsoft.com/office/drawing/2010/main">
+                  <a14:imgLayer r:embed="rId8">
+                    <a14:imgEffect>
+                      <a14:artisticBlur/>
+                    </a14:imgEffect>
+                  </a14:imgLayer>
+                </a14:imgProps>
+              </a:ext>
               <a:ext uri="{28A0092B-C50C-407E-A947-70E740481C1C}">
                 <a14:useLocalDpi xmlns:a14="http://schemas.microsoft.com/office/drawing/2010/main" val="0"/>
               </a:ext>
@@ -6402,7 +6404,7 @@
           <p:nvPr/>
         </p:nvPicPr>
         <p:blipFill>
-          <a:blip r:embed="rId7">
+          <a:blip r:embed="rId9">
             <a:extLst>
               <a:ext uri="{28A0092B-C50C-407E-A947-70E740481C1C}">
                 <a14:useLocalDpi xmlns:a14="http://schemas.microsoft.com/office/drawing/2010/main" val="0"/>
@@ -6623,7 +6625,7 @@
           <p:nvPr/>
         </p:nvPicPr>
         <p:blipFill>
-          <a:blip r:embed="rId8">
+          <a:blip r:embed="rId10">
             <a:extLst>
               <a:ext uri="{28A0092B-C50C-407E-A947-70E740481C1C}">
                 <a14:useLocalDpi xmlns:a14="http://schemas.microsoft.com/office/drawing/2010/main" val="0"/>
@@ -6849,7 +6851,7 @@
           <p:nvPr/>
         </p:nvPicPr>
         <p:blipFill>
-          <a:blip r:embed="rId9">
+          <a:blip r:embed="rId11">
             <a:extLst>
               <a:ext uri="{28A0092B-C50C-407E-A947-70E740481C1C}">
                 <a14:useLocalDpi xmlns:a14="http://schemas.microsoft.com/office/drawing/2010/main" val="0"/>
@@ -6909,7 +6911,7 @@
           <p:nvPr/>
         </p:nvPicPr>
         <p:blipFill>
-          <a:blip r:embed="rId9">
+          <a:blip r:embed="rId11">
             <a:extLst>
               <a:ext uri="{28A0092B-C50C-407E-A947-70E740481C1C}">
                 <a14:useLocalDpi xmlns:a14="http://schemas.microsoft.com/office/drawing/2010/main" val="0"/>
@@ -6969,7 +6971,7 @@
           <p:nvPr/>
         </p:nvPicPr>
         <p:blipFill>
-          <a:blip r:embed="rId10">
+          <a:blip r:embed="rId12">
             <a:extLst>
               <a:ext uri="{28A0092B-C50C-407E-A947-70E740481C1C}">
                 <a14:useLocalDpi xmlns:a14="http://schemas.microsoft.com/office/drawing/2010/main" val="0"/>
@@ -7190,7 +7192,7 @@
           <p:nvPr/>
         </p:nvPicPr>
         <p:blipFill>
-          <a:blip r:embed="rId11">
+          <a:blip r:embed="rId13">
             <a:extLst>
               <a:ext uri="{28A0092B-C50C-407E-A947-70E740481C1C}">
                 <a14:useLocalDpi xmlns:a14="http://schemas.microsoft.com/office/drawing/2010/main" val="0"/>
@@ -7250,7 +7252,7 @@
           <p:nvPr/>
         </p:nvPicPr>
         <p:blipFill>
-          <a:blip r:embed="rId12">
+          <a:blip r:embed="rId14">
             <a:extLst>
               <a:ext uri="{28A0092B-C50C-407E-A947-70E740481C1C}">
                 <a14:useLocalDpi xmlns:a14="http://schemas.microsoft.com/office/drawing/2010/main" val="0"/>
@@ -7264,7 +7266,7 @@
         </p:blipFill>
         <p:spPr bwMode="auto">
           <a:xfrm>
-            <a:off x="8308603" y="490858"/>
+            <a:off x="8458200" y="522221"/>
             <a:ext cx="762000" cy="762000"/>
           </a:xfrm>
           <a:prstGeom prst="rect">
@@ -7311,7 +7313,7 @@
         </p:nvSpPr>
         <p:spPr bwMode="auto">
           <a:xfrm>
-            <a:off x="7597203" y="1244850"/>
+            <a:off x="7697726" y="1311300"/>
             <a:ext cx="2292350" cy="276999"/>
           </a:xfrm>
           <a:prstGeom prst="rect">
@@ -7465,7 +7467,7 @@
         <p:grpSpPr>
           <a:xfrm>
             <a:off x="2061639" y="317500"/>
-            <a:ext cx="5766668" cy="2443630"/>
+            <a:ext cx="5920312" cy="2443630"/>
             <a:chOff x="2061639" y="317500"/>
             <a:chExt cx="5766668" cy="2443630"/>
           </a:xfrm>
@@ -7549,7 +7551,7 @@
             <p:nvPr/>
           </p:nvPicPr>
           <p:blipFill>
-            <a:blip r:embed="rId13">
+            <a:blip r:embed="rId15">
               <a:extLst>
                 <a:ext uri="{28A0092B-C50C-407E-A947-70E740481C1C}">
                   <a14:useLocalDpi xmlns:a14="http://schemas.microsoft.com/office/drawing/2010/main" val="0"/>
@@ -7743,7 +7745,7 @@
           <p:nvPr/>
         </p:nvPicPr>
         <p:blipFill>
-          <a:blip r:embed="rId14">
+          <a:blip r:embed="rId16">
             <a:extLst>
               <a:ext uri="{28A0092B-C50C-407E-A947-70E740481C1C}">
                 <a14:useLocalDpi xmlns:a14="http://schemas.microsoft.com/office/drawing/2010/main" val="0"/>
@@ -7962,7 +7964,7 @@
         </p:nvSpPr>
         <p:spPr>
           <a:xfrm>
-            <a:off x="6541605" y="1937151"/>
+            <a:off x="6656947" y="1937150"/>
             <a:ext cx="1545900" cy="208200"/>
           </a:xfrm>
           <a:prstGeom prst="rect">
@@ -8005,7 +8007,7 @@
         <p:spPr>
           <a:xfrm>
             <a:off x="6198585" y="1755085"/>
-            <a:ext cx="822325" cy="0"/>
+            <a:ext cx="938815" cy="6350"/>
           </a:xfrm>
           <a:prstGeom prst="straightConnector1">
             <a:avLst/>
@@ -8033,6 +8035,40 @@
           </a:fontRef>
         </p:style>
       </p:cxnSp>
+      <p:sp>
+        <p:nvSpPr>
+          <p:cNvPr id="82" name="Google Shape;70;p13"/>
+          <p:cNvSpPr txBox="1"/>
+          <p:nvPr/>
+        </p:nvSpPr>
+        <p:spPr>
+          <a:xfrm>
+            <a:off x="6123572" y="1420960"/>
+            <a:ext cx="1022999" cy="171300"/>
+          </a:xfrm>
+          <a:prstGeom prst="rect">
+            <a:avLst/>
+          </a:prstGeom>
+          <a:noFill/>
+          <a:ln>
+            <a:noFill/>
+          </a:ln>
+        </p:spPr>
+        <p:txBody>
+          <a:bodyPr spcFirstLastPara="1" wrap="square" lIns="91425" tIns="91425" rIns="91425" bIns="91425" anchor="t" anchorCtr="0">
+            <a:noAutofit/>
+          </a:bodyPr>
+          <a:lstStyle/>
+          <a:p>
+            <a:pPr algn="ctr"/>
+            <a:r>
+              <a:rPr lang="en" sz="1200" dirty="0" smtClean="0"/>
+              <a:t>Install agent</a:t>
+            </a:r>
+            <a:endParaRPr sz="1200" dirty="0"/>
+          </a:p>
+        </p:txBody>
+      </p:sp>
     </p:spTree>
   </p:cSld>
   <p:clrMapOvr>

</xml_diff>

<commit_message>
Production doc builds - 2021/02/18 17:54:26 UTC
</commit_message>
<xml_diff>
--- a/docs/images/new-relic-architecture-diagram.pptx
+++ b/docs/images/new-relic-architecture-diagram.pptx
@@ -5866,7 +5866,7 @@
         <p:spPr>
           <a:xfrm>
             <a:off x="429938" y="125607"/>
-            <a:ext cx="9266512" cy="3984431"/>
+            <a:ext cx="8034612" cy="3925693"/>
           </a:xfrm>
           <a:prstGeom prst="rect">
             <a:avLst/>
@@ -6034,232 +6034,247 @@
           </a:extLst>
         </p:spPr>
       </p:pic>
-      <p:pic>
-        <p:nvPicPr>
-          <p:cNvPr id="30" name="Graphic 19">
+      <p:grpSp>
+        <p:nvGrpSpPr>
+          <p:cNvPr id="10" name="Group 9"/>
+          <p:cNvGrpSpPr/>
+          <p:nvPr/>
+        </p:nvGrpSpPr>
+        <p:grpSpPr>
+          <a:xfrm>
+            <a:off x="1297526" y="2910805"/>
+            <a:ext cx="2279650" cy="1029825"/>
+            <a:chOff x="2980670" y="2957211"/>
+            <a:chExt cx="2279650" cy="1029825"/>
+          </a:xfrm>
+        </p:grpSpPr>
+        <p:pic>
+          <p:nvPicPr>
+            <p:cNvPr id="30" name="Graphic 19">
+              <a:extLst>
+                <a:ext uri="{FF2B5EF4-FFF2-40B4-BE49-F238E27FC236}">
+                  <a16:creationId xmlns:a16="http://schemas.microsoft.com/office/drawing/2014/main" id="{ED9F78BE-213C-3D47-A534-0B86E72111B5}"/>
+                </a:ext>
+              </a:extLst>
+            </p:cNvPr>
+            <p:cNvPicPr>
+              <a:picLocks noChangeAspect="1" noChangeArrowheads="1"/>
+            </p:cNvPicPr>
+            <p:nvPr/>
+          </p:nvPicPr>
+          <p:blipFill>
+            <a:blip r:embed="rId5">
+              <a:extLst>
+                <a:ext uri="{28A0092B-C50C-407E-A947-70E740481C1C}">
+                  <a14:useLocalDpi xmlns:a14="http://schemas.microsoft.com/office/drawing/2010/main" val="0"/>
+                </a:ext>
+              </a:extLst>
+            </a:blip>
+            <a:srcRect/>
+            <a:stretch>
+              <a:fillRect/>
+            </a:stretch>
+          </p:blipFill>
+          <p:spPr bwMode="auto">
+            <a:xfrm>
+              <a:off x="3732800" y="2957211"/>
+              <a:ext cx="762000" cy="762000"/>
+            </a:xfrm>
+            <a:prstGeom prst="rect">
+              <a:avLst/>
+            </a:prstGeom>
+            <a:noFill/>
+            <a:ln>
+              <a:noFill/>
+            </a:ln>
             <a:extLst>
-              <a:ext uri="{FF2B5EF4-FFF2-40B4-BE49-F238E27FC236}">
-                <a16:creationId xmlns:a16="http://schemas.microsoft.com/office/drawing/2014/main" id="{ED9F78BE-213C-3D47-A534-0B86E72111B5}"/>
+              <a:ext uri="{909E8E84-426E-40DD-AFC4-6F175D3DCCD1}">
+                <a14:hiddenFill xmlns:a14="http://schemas.microsoft.com/office/drawing/2010/main">
+                  <a:solidFill>
+                    <a:srgbClr val="FFFFFF"/>
+                  </a:solidFill>
+                </a14:hiddenFill>
+              </a:ext>
+              <a:ext uri="{91240B29-F687-4F45-9708-019B960494DF}">
+                <a14:hiddenLine xmlns:a14="http://schemas.microsoft.com/office/drawing/2010/main" w="9525">
+                  <a:solidFill>
+                    <a:srgbClr val="000000"/>
+                  </a:solidFill>
+                  <a:miter lim="800000"/>
+                  <a:headEnd/>
+                  <a:tailEnd/>
+                </a14:hiddenLine>
               </a:ext>
             </a:extLst>
-          </p:cNvPr>
-          <p:cNvPicPr>
-            <a:picLocks noChangeAspect="1" noChangeArrowheads="1"/>
-          </p:cNvPicPr>
-          <p:nvPr/>
-        </p:nvPicPr>
-        <p:blipFill>
-          <a:blip r:embed="rId5">
+          </p:spPr>
+        </p:pic>
+        <p:sp>
+          <p:nvSpPr>
+            <p:cNvPr id="31" name="TextBox 12">
+              <a:extLst>
+                <a:ext uri="{FF2B5EF4-FFF2-40B4-BE49-F238E27FC236}">
+                  <a16:creationId xmlns:a16="http://schemas.microsoft.com/office/drawing/2014/main" id="{E6D95FBB-6754-2D45-B10F-73837D3E14EA}"/>
+                </a:ext>
+              </a:extLst>
+            </p:cNvPr>
+            <p:cNvSpPr txBox="1">
+              <a:spLocks noChangeArrowheads="1"/>
+            </p:cNvSpPr>
+            <p:nvPr/>
+          </p:nvSpPr>
+          <p:spPr bwMode="auto">
+            <a:xfrm>
+              <a:off x="2980670" y="3710037"/>
+              <a:ext cx="2279650" cy="276999"/>
+            </a:xfrm>
+            <a:prstGeom prst="rect">
+              <a:avLst/>
+            </a:prstGeom>
+            <a:noFill/>
+            <a:ln>
+              <a:noFill/>
+            </a:ln>
             <a:extLst>
-              <a:ext uri="{28A0092B-C50C-407E-A947-70E740481C1C}">
-                <a14:useLocalDpi xmlns:a14="http://schemas.microsoft.com/office/drawing/2010/main" val="0"/>
+              <a:ext uri="{909E8E84-426E-40DD-AFC4-6F175D3DCCD1}">
+                <a14:hiddenFill xmlns:a14="http://schemas.microsoft.com/office/drawing/2010/main">
+                  <a:solidFill>
+                    <a:srgbClr val="FFFFFF"/>
+                  </a:solidFill>
+                </a14:hiddenFill>
+              </a:ext>
+              <a:ext uri="{91240B29-F687-4F45-9708-019B960494DF}">
+                <a14:hiddenLine xmlns:a14="http://schemas.microsoft.com/office/drawing/2010/main" w="9525">
+                  <a:solidFill>
+                    <a:srgbClr val="000000"/>
+                  </a:solidFill>
+                  <a:miter lim="800000"/>
+                  <a:headEnd/>
+                  <a:tailEnd/>
+                </a14:hiddenLine>
               </a:ext>
             </a:extLst>
-          </a:blip>
-          <a:srcRect/>
-          <a:stretch>
-            <a:fillRect/>
-          </a:stretch>
-        </p:blipFill>
-        <p:spPr bwMode="auto">
-          <a:xfrm>
-            <a:off x="3732800" y="2957211"/>
-            <a:ext cx="762000" cy="762000"/>
-          </a:xfrm>
-          <a:prstGeom prst="rect">
-            <a:avLst/>
-          </a:prstGeom>
-          <a:noFill/>
-          <a:ln>
-            <a:noFill/>
-          </a:ln>
-          <a:extLst>
-            <a:ext uri="{909E8E84-426E-40DD-AFC4-6F175D3DCCD1}">
-              <a14:hiddenFill xmlns:a14="http://schemas.microsoft.com/office/drawing/2010/main">
-                <a:solidFill>
-                  <a:srgbClr val="FFFFFF"/>
-                </a:solidFill>
-              </a14:hiddenFill>
-            </a:ext>
-            <a:ext uri="{91240B29-F687-4F45-9708-019B960494DF}">
-              <a14:hiddenLine xmlns:a14="http://schemas.microsoft.com/office/drawing/2010/main" w="9525">
-                <a:solidFill>
-                  <a:srgbClr val="000000"/>
-                </a:solidFill>
-                <a:miter lim="800000"/>
-                <a:headEnd/>
-                <a:tailEnd/>
-              </a14:hiddenLine>
-            </a:ext>
-          </a:extLst>
-        </p:spPr>
-      </p:pic>
-      <p:sp>
-        <p:nvSpPr>
-          <p:cNvPr id="31" name="TextBox 12">
-            <a:extLst>
-              <a:ext uri="{FF2B5EF4-FFF2-40B4-BE49-F238E27FC236}">
-                <a16:creationId xmlns:a16="http://schemas.microsoft.com/office/drawing/2014/main" id="{E6D95FBB-6754-2D45-B10F-73837D3E14EA}"/>
-              </a:ext>
-            </a:extLst>
-          </p:cNvPr>
-          <p:cNvSpPr txBox="1">
-            <a:spLocks noChangeArrowheads="1"/>
-          </p:cNvSpPr>
-          <p:nvPr/>
-        </p:nvSpPr>
-        <p:spPr bwMode="auto">
-          <a:xfrm>
-            <a:off x="2980670" y="3710037"/>
-            <a:ext cx="2279650" cy="276999"/>
-          </a:xfrm>
-          <a:prstGeom prst="rect">
-            <a:avLst/>
-          </a:prstGeom>
-          <a:noFill/>
-          <a:ln>
-            <a:noFill/>
-          </a:ln>
-          <a:extLst>
-            <a:ext uri="{909E8E84-426E-40DD-AFC4-6F175D3DCCD1}">
-              <a14:hiddenFill xmlns:a14="http://schemas.microsoft.com/office/drawing/2010/main">
-                <a:solidFill>
-                  <a:srgbClr val="FFFFFF"/>
-                </a:solidFill>
-              </a14:hiddenFill>
-            </a:ext>
-            <a:ext uri="{91240B29-F687-4F45-9708-019B960494DF}">
-              <a14:hiddenLine xmlns:a14="http://schemas.microsoft.com/office/drawing/2010/main" w="9525">
-                <a:solidFill>
-                  <a:srgbClr val="000000"/>
-                </a:solidFill>
-                <a:miter lim="800000"/>
-                <a:headEnd/>
-                <a:tailEnd/>
-              </a14:hiddenLine>
-            </a:ext>
-          </a:extLst>
-        </p:spPr>
-        <p:txBody>
-          <a:bodyPr>
-            <a:spAutoFit/>
-          </a:bodyPr>
-          <a:lstStyle>
-            <a:lvl1pPr>
-              <a:defRPr>
-                <a:solidFill>
-                  <a:schemeClr val="tx1"/>
-                </a:solidFill>
-                <a:latin typeface="Calibri" panose="020F0502020204030204" pitchFamily="34" charset="0"/>
-              </a:defRPr>
-            </a:lvl1pPr>
-            <a:lvl2pPr marL="742950" indent="-285750">
-              <a:defRPr>
-                <a:solidFill>
-                  <a:schemeClr val="tx1"/>
-                </a:solidFill>
-                <a:latin typeface="Calibri" panose="020F0502020204030204" pitchFamily="34" charset="0"/>
-              </a:defRPr>
-            </a:lvl2pPr>
-            <a:lvl3pPr marL="1143000" indent="-228600">
-              <a:defRPr>
-                <a:solidFill>
-                  <a:schemeClr val="tx1"/>
-                </a:solidFill>
-                <a:latin typeface="Calibri" panose="020F0502020204030204" pitchFamily="34" charset="0"/>
-              </a:defRPr>
-            </a:lvl3pPr>
-            <a:lvl4pPr marL="1600200" indent="-228600">
-              <a:defRPr>
-                <a:solidFill>
-                  <a:schemeClr val="tx1"/>
-                </a:solidFill>
-                <a:latin typeface="Calibri" panose="020F0502020204030204" pitchFamily="34" charset="0"/>
-              </a:defRPr>
-            </a:lvl4pPr>
-            <a:lvl5pPr marL="2057400" indent="-228600">
-              <a:defRPr>
-                <a:solidFill>
-                  <a:schemeClr val="tx1"/>
-                </a:solidFill>
-                <a:latin typeface="Calibri" panose="020F0502020204030204" pitchFamily="34" charset="0"/>
-              </a:defRPr>
-            </a:lvl5pPr>
-            <a:lvl6pPr marL="2514600" indent="-228600" eaLnBrk="0" fontAlgn="base" hangingPunct="0">
-              <a:spcBef>
-                <a:spcPct val="0"/>
-              </a:spcBef>
-              <a:spcAft>
-                <a:spcPct val="0"/>
-              </a:spcAft>
-              <a:defRPr>
-                <a:solidFill>
-                  <a:schemeClr val="tx1"/>
-                </a:solidFill>
-                <a:latin typeface="Calibri" panose="020F0502020204030204" pitchFamily="34" charset="0"/>
-              </a:defRPr>
-            </a:lvl6pPr>
-            <a:lvl7pPr marL="2971800" indent="-228600" eaLnBrk="0" fontAlgn="base" hangingPunct="0">
-              <a:spcBef>
-                <a:spcPct val="0"/>
-              </a:spcBef>
-              <a:spcAft>
-                <a:spcPct val="0"/>
-              </a:spcAft>
-              <a:defRPr>
-                <a:solidFill>
-                  <a:schemeClr val="tx1"/>
-                </a:solidFill>
-                <a:latin typeface="Calibri" panose="020F0502020204030204" pitchFamily="34" charset="0"/>
-              </a:defRPr>
-            </a:lvl7pPr>
-            <a:lvl8pPr marL="3429000" indent="-228600" eaLnBrk="0" fontAlgn="base" hangingPunct="0">
-              <a:spcBef>
-                <a:spcPct val="0"/>
-              </a:spcBef>
-              <a:spcAft>
-                <a:spcPct val="0"/>
-              </a:spcAft>
-              <a:defRPr>
-                <a:solidFill>
-                  <a:schemeClr val="tx1"/>
-                </a:solidFill>
-                <a:latin typeface="Calibri" panose="020F0502020204030204" pitchFamily="34" charset="0"/>
-              </a:defRPr>
-            </a:lvl8pPr>
-            <a:lvl9pPr marL="3886200" indent="-228600" eaLnBrk="0" fontAlgn="base" hangingPunct="0">
-              <a:spcBef>
-                <a:spcPct val="0"/>
-              </a:spcBef>
-              <a:spcAft>
-                <a:spcPct val="0"/>
-              </a:spcAft>
-              <a:defRPr>
-                <a:solidFill>
-                  <a:schemeClr val="tx1"/>
-                </a:solidFill>
-                <a:latin typeface="Calibri" panose="020F0502020204030204" pitchFamily="34" charset="0"/>
-              </a:defRPr>
-            </a:lvl9pPr>
-          </a:lstStyle>
-          <a:p>
-            <a:pPr algn="ctr" eaLnBrk="1" hangingPunct="1"/>
-            <a:r>
-              <a:rPr lang="en-US" altLang="en-US" sz="1200" dirty="0">
+          </p:spPr>
+          <p:txBody>
+            <a:bodyPr>
+              <a:spAutoFit/>
+            </a:bodyPr>
+            <a:lstStyle>
+              <a:lvl1pPr>
+                <a:defRPr>
+                  <a:solidFill>
+                    <a:schemeClr val="tx1"/>
+                  </a:solidFill>
+                  <a:latin typeface="Calibri" panose="020F0502020204030204" pitchFamily="34" charset="0"/>
+                </a:defRPr>
+              </a:lvl1pPr>
+              <a:lvl2pPr marL="742950" indent="-285750">
+                <a:defRPr>
+                  <a:solidFill>
+                    <a:schemeClr val="tx1"/>
+                  </a:solidFill>
+                  <a:latin typeface="Calibri" panose="020F0502020204030204" pitchFamily="34" charset="0"/>
+                </a:defRPr>
+              </a:lvl2pPr>
+              <a:lvl3pPr marL="1143000" indent="-228600">
+                <a:defRPr>
+                  <a:solidFill>
+                    <a:schemeClr val="tx1"/>
+                  </a:solidFill>
+                  <a:latin typeface="Calibri" panose="020F0502020204030204" pitchFamily="34" charset="0"/>
+                </a:defRPr>
+              </a:lvl3pPr>
+              <a:lvl4pPr marL="1600200" indent="-228600">
+                <a:defRPr>
+                  <a:solidFill>
+                    <a:schemeClr val="tx1"/>
+                  </a:solidFill>
+                  <a:latin typeface="Calibri" panose="020F0502020204030204" pitchFamily="34" charset="0"/>
+                </a:defRPr>
+              </a:lvl4pPr>
+              <a:lvl5pPr marL="2057400" indent="-228600">
+                <a:defRPr>
+                  <a:solidFill>
+                    <a:schemeClr val="tx1"/>
+                  </a:solidFill>
+                  <a:latin typeface="Calibri" panose="020F0502020204030204" pitchFamily="34" charset="0"/>
+                </a:defRPr>
+              </a:lvl5pPr>
+              <a:lvl6pPr marL="2514600" indent="-228600" eaLnBrk="0" fontAlgn="base" hangingPunct="0">
+                <a:spcBef>
+                  <a:spcPct val="0"/>
+                </a:spcBef>
+                <a:spcAft>
+                  <a:spcPct val="0"/>
+                </a:spcAft>
+                <a:defRPr>
+                  <a:solidFill>
+                    <a:schemeClr val="tx1"/>
+                  </a:solidFill>
+                  <a:latin typeface="Calibri" panose="020F0502020204030204" pitchFamily="34" charset="0"/>
+                </a:defRPr>
+              </a:lvl6pPr>
+              <a:lvl7pPr marL="2971800" indent="-228600" eaLnBrk="0" fontAlgn="base" hangingPunct="0">
+                <a:spcBef>
+                  <a:spcPct val="0"/>
+                </a:spcBef>
+                <a:spcAft>
+                  <a:spcPct val="0"/>
+                </a:spcAft>
+                <a:defRPr>
+                  <a:solidFill>
+                    <a:schemeClr val="tx1"/>
+                  </a:solidFill>
+                  <a:latin typeface="Calibri" panose="020F0502020204030204" pitchFamily="34" charset="0"/>
+                </a:defRPr>
+              </a:lvl7pPr>
+              <a:lvl8pPr marL="3429000" indent="-228600" eaLnBrk="0" fontAlgn="base" hangingPunct="0">
+                <a:spcBef>
+                  <a:spcPct val="0"/>
+                </a:spcBef>
+                <a:spcAft>
+                  <a:spcPct val="0"/>
+                </a:spcAft>
+                <a:defRPr>
+                  <a:solidFill>
+                    <a:schemeClr val="tx1"/>
+                  </a:solidFill>
+                  <a:latin typeface="Calibri" panose="020F0502020204030204" pitchFamily="34" charset="0"/>
+                </a:defRPr>
+              </a:lvl8pPr>
+              <a:lvl9pPr marL="3886200" indent="-228600" eaLnBrk="0" fontAlgn="base" hangingPunct="0">
+                <a:spcBef>
+                  <a:spcPct val="0"/>
+                </a:spcBef>
+                <a:spcAft>
+                  <a:spcPct val="0"/>
+                </a:spcAft>
+                <a:defRPr>
+                  <a:solidFill>
+                    <a:schemeClr val="tx1"/>
+                  </a:solidFill>
+                  <a:latin typeface="Calibri" panose="020F0502020204030204" pitchFamily="34" charset="0"/>
+                </a:defRPr>
+              </a:lvl9pPr>
+            </a:lstStyle>
+            <a:p>
+              <a:pPr algn="ctr" eaLnBrk="1" hangingPunct="1"/>
+              <a:r>
+                <a:rPr lang="en-US" altLang="en-US" sz="1200" dirty="0">
+                  <a:latin typeface="Arial" panose="020B0604020202020204" pitchFamily="34" charset="0"/>
+                  <a:ea typeface="Amazon Ember" panose="020B0603020204020204" pitchFamily="34" charset="0"/>
+                  <a:cs typeface="Arial" panose="020B0604020202020204" pitchFamily="34" charset="0"/>
+                </a:rPr>
+                <a:t>AWS IAM</a:t>
+              </a:r>
+              <a:endParaRPr lang="en-US" altLang="en-US" sz="1200" dirty="0">
                 <a:latin typeface="Arial" panose="020B0604020202020204" pitchFamily="34" charset="0"/>
                 <a:ea typeface="Amazon Ember" panose="020B0603020204020204" pitchFamily="34" charset="0"/>
                 <a:cs typeface="Arial" panose="020B0604020202020204" pitchFamily="34" charset="0"/>
-              </a:rPr>
-              <a:t>AWS IAM</a:t>
-            </a:r>
-            <a:endParaRPr lang="en-US" altLang="en-US" sz="1200" dirty="0">
-              <a:latin typeface="Arial" panose="020B0604020202020204" pitchFamily="34" charset="0"/>
-              <a:ea typeface="Amazon Ember" panose="020B0603020204020204" pitchFamily="34" charset="0"/>
-              <a:cs typeface="Arial" panose="020B0604020202020204" pitchFamily="34" charset="0"/>
-            </a:endParaRPr>
-          </a:p>
-        </p:txBody>
-      </p:sp>
+              </a:endParaRPr>
+            </a:p>
+          </p:txBody>
+        </p:sp>
+      </p:grpSp>
       <p:pic>
         <p:nvPicPr>
           <p:cNvPr id="32" name="Graphic 49">
@@ -6389,453 +6404,242 @@
           </a:extLst>
         </p:spPr>
       </p:pic>
-      <p:pic>
-        <p:nvPicPr>
-          <p:cNvPr id="34" name="Graphic 15">
+      <p:grpSp>
+        <p:nvGrpSpPr>
+          <p:cNvPr id="12" name="Group 11"/>
+          <p:cNvGrpSpPr/>
+          <p:nvPr/>
+        </p:nvGrpSpPr>
+        <p:grpSpPr>
+          <a:xfrm>
+            <a:off x="4759829" y="2909075"/>
+            <a:ext cx="2292350" cy="1023074"/>
+            <a:chOff x="6307362" y="2953023"/>
+            <a:chExt cx="2292350" cy="1023074"/>
+          </a:xfrm>
+        </p:grpSpPr>
+        <p:pic>
+          <p:nvPicPr>
+            <p:cNvPr id="34" name="Graphic 15">
+              <a:extLst>
+                <a:ext uri="{FF2B5EF4-FFF2-40B4-BE49-F238E27FC236}">
+                  <a16:creationId xmlns:a16="http://schemas.microsoft.com/office/drawing/2014/main" id="{3A010F8A-DF9B-CA43-8D41-3A122544E272}"/>
+                </a:ext>
+              </a:extLst>
+            </p:cNvPr>
+            <p:cNvPicPr>
+              <a:picLocks noChangeAspect="1" noChangeArrowheads="1"/>
+            </p:cNvPicPr>
+            <p:nvPr/>
+          </p:nvPicPr>
+          <p:blipFill>
+            <a:blip r:embed="rId9">
+              <a:extLst>
+                <a:ext uri="{28A0092B-C50C-407E-A947-70E740481C1C}">
+                  <a14:useLocalDpi xmlns:a14="http://schemas.microsoft.com/office/drawing/2010/main" val="0"/>
+                </a:ext>
+              </a:extLst>
+            </a:blip>
+            <a:srcRect/>
+            <a:stretch>
+              <a:fillRect/>
+            </a:stretch>
+          </p:blipFill>
+          <p:spPr bwMode="auto">
+            <a:xfrm>
+              <a:off x="7066307" y="2953023"/>
+              <a:ext cx="762000" cy="762000"/>
+            </a:xfrm>
+            <a:prstGeom prst="rect">
+              <a:avLst/>
+            </a:prstGeom>
+            <a:noFill/>
+            <a:ln>
+              <a:noFill/>
+            </a:ln>
             <a:extLst>
-              <a:ext uri="{FF2B5EF4-FFF2-40B4-BE49-F238E27FC236}">
-                <a16:creationId xmlns:a16="http://schemas.microsoft.com/office/drawing/2014/main" id="{3A010F8A-DF9B-CA43-8D41-3A122544E272}"/>
+              <a:ext uri="{909E8E84-426E-40DD-AFC4-6F175D3DCCD1}">
+                <a14:hiddenFill xmlns:a14="http://schemas.microsoft.com/office/drawing/2010/main">
+                  <a:solidFill>
+                    <a:srgbClr val="FFFFFF"/>
+                  </a:solidFill>
+                </a14:hiddenFill>
+              </a:ext>
+              <a:ext uri="{91240B29-F687-4F45-9708-019B960494DF}">
+                <a14:hiddenLine xmlns:a14="http://schemas.microsoft.com/office/drawing/2010/main" w="9525">
+                  <a:solidFill>
+                    <a:srgbClr val="000000"/>
+                  </a:solidFill>
+                  <a:miter lim="800000"/>
+                  <a:headEnd/>
+                  <a:tailEnd/>
+                </a14:hiddenLine>
               </a:ext>
             </a:extLst>
-          </p:cNvPr>
-          <p:cNvPicPr>
-            <a:picLocks noChangeAspect="1" noChangeArrowheads="1"/>
-          </p:cNvPicPr>
-          <p:nvPr/>
-        </p:nvPicPr>
-        <p:blipFill>
-          <a:blip r:embed="rId9">
+          </p:spPr>
+        </p:pic>
+        <p:sp>
+          <p:nvSpPr>
+            <p:cNvPr id="35" name="TextBox 11">
+              <a:extLst>
+                <a:ext uri="{FF2B5EF4-FFF2-40B4-BE49-F238E27FC236}">
+                  <a16:creationId xmlns:a16="http://schemas.microsoft.com/office/drawing/2014/main" id="{EE7EF599-CC93-1843-94CE-F010641A8D23}"/>
+                </a:ext>
+              </a:extLst>
+            </p:cNvPr>
+            <p:cNvSpPr txBox="1">
+              <a:spLocks noChangeArrowheads="1"/>
+            </p:cNvSpPr>
+            <p:nvPr/>
+          </p:nvSpPr>
+          <p:spPr bwMode="auto">
+            <a:xfrm>
+              <a:off x="6307362" y="3699098"/>
+              <a:ext cx="2292350" cy="276999"/>
+            </a:xfrm>
+            <a:prstGeom prst="rect">
+              <a:avLst/>
+            </a:prstGeom>
+            <a:noFill/>
+            <a:ln>
+              <a:noFill/>
+            </a:ln>
             <a:extLst>
-              <a:ext uri="{28A0092B-C50C-407E-A947-70E740481C1C}">
-                <a14:useLocalDpi xmlns:a14="http://schemas.microsoft.com/office/drawing/2010/main" val="0"/>
+              <a:ext uri="{909E8E84-426E-40DD-AFC4-6F175D3DCCD1}">
+                <a14:hiddenFill xmlns:a14="http://schemas.microsoft.com/office/drawing/2010/main">
+                  <a:solidFill>
+                    <a:srgbClr val="FFFFFF"/>
+                  </a:solidFill>
+                </a14:hiddenFill>
+              </a:ext>
+              <a:ext uri="{91240B29-F687-4F45-9708-019B960494DF}">
+                <a14:hiddenLine xmlns:a14="http://schemas.microsoft.com/office/drawing/2010/main" w="9525">
+                  <a:solidFill>
+                    <a:srgbClr val="000000"/>
+                  </a:solidFill>
+                  <a:miter lim="800000"/>
+                  <a:headEnd/>
+                  <a:tailEnd/>
+                </a14:hiddenLine>
               </a:ext>
             </a:extLst>
-          </a:blip>
-          <a:srcRect/>
-          <a:stretch>
-            <a:fillRect/>
-          </a:stretch>
-        </p:blipFill>
-        <p:spPr bwMode="auto">
-          <a:xfrm>
-            <a:off x="7066307" y="2953023"/>
-            <a:ext cx="762000" cy="762000"/>
-          </a:xfrm>
-          <a:prstGeom prst="rect">
-            <a:avLst/>
-          </a:prstGeom>
-          <a:noFill/>
-          <a:ln>
-            <a:noFill/>
-          </a:ln>
-          <a:extLst>
-            <a:ext uri="{909E8E84-426E-40DD-AFC4-6F175D3DCCD1}">
-              <a14:hiddenFill xmlns:a14="http://schemas.microsoft.com/office/drawing/2010/main">
-                <a:solidFill>
-                  <a:srgbClr val="FFFFFF"/>
-                </a:solidFill>
-              </a14:hiddenFill>
-            </a:ext>
-            <a:ext uri="{91240B29-F687-4F45-9708-019B960494DF}">
-              <a14:hiddenLine xmlns:a14="http://schemas.microsoft.com/office/drawing/2010/main" w="9525">
-                <a:solidFill>
-                  <a:srgbClr val="000000"/>
-                </a:solidFill>
-                <a:miter lim="800000"/>
-                <a:headEnd/>
-                <a:tailEnd/>
-              </a14:hiddenLine>
-            </a:ext>
-          </a:extLst>
-        </p:spPr>
-      </p:pic>
-      <p:sp>
-        <p:nvSpPr>
-          <p:cNvPr id="35" name="TextBox 11">
-            <a:extLst>
-              <a:ext uri="{FF2B5EF4-FFF2-40B4-BE49-F238E27FC236}">
-                <a16:creationId xmlns:a16="http://schemas.microsoft.com/office/drawing/2014/main" id="{EE7EF599-CC93-1843-94CE-F010641A8D23}"/>
-              </a:ext>
-            </a:extLst>
-          </p:cNvPr>
-          <p:cNvSpPr txBox="1">
-            <a:spLocks noChangeArrowheads="1"/>
-          </p:cNvSpPr>
-          <p:nvPr/>
-        </p:nvSpPr>
-        <p:spPr bwMode="auto">
-          <a:xfrm>
-            <a:off x="6307362" y="3699098"/>
-            <a:ext cx="2292350" cy="276999"/>
-          </a:xfrm>
-          <a:prstGeom prst="rect">
-            <a:avLst/>
-          </a:prstGeom>
-          <a:noFill/>
-          <a:ln>
-            <a:noFill/>
-          </a:ln>
-          <a:extLst>
-            <a:ext uri="{909E8E84-426E-40DD-AFC4-6F175D3DCCD1}">
-              <a14:hiddenFill xmlns:a14="http://schemas.microsoft.com/office/drawing/2010/main">
-                <a:solidFill>
-                  <a:srgbClr val="FFFFFF"/>
-                </a:solidFill>
-              </a14:hiddenFill>
-            </a:ext>
-            <a:ext uri="{91240B29-F687-4F45-9708-019B960494DF}">
-              <a14:hiddenLine xmlns:a14="http://schemas.microsoft.com/office/drawing/2010/main" w="9525">
-                <a:solidFill>
-                  <a:srgbClr val="000000"/>
-                </a:solidFill>
-                <a:miter lim="800000"/>
-                <a:headEnd/>
-                <a:tailEnd/>
-              </a14:hiddenLine>
-            </a:ext>
-          </a:extLst>
-        </p:spPr>
-        <p:txBody>
-          <a:bodyPr>
-            <a:spAutoFit/>
-          </a:bodyPr>
-          <a:lstStyle>
-            <a:lvl1pPr>
-              <a:defRPr>
-                <a:solidFill>
-                  <a:schemeClr val="tx1"/>
-                </a:solidFill>
-                <a:latin typeface="Calibri" panose="020F0502020204030204" pitchFamily="34" charset="0"/>
-              </a:defRPr>
-            </a:lvl1pPr>
-            <a:lvl2pPr marL="742950" indent="-285750">
-              <a:defRPr>
-                <a:solidFill>
-                  <a:schemeClr val="tx1"/>
-                </a:solidFill>
-                <a:latin typeface="Calibri" panose="020F0502020204030204" pitchFamily="34" charset="0"/>
-              </a:defRPr>
-            </a:lvl2pPr>
-            <a:lvl3pPr marL="1143000" indent="-228600">
-              <a:defRPr>
-                <a:solidFill>
-                  <a:schemeClr val="tx1"/>
-                </a:solidFill>
-                <a:latin typeface="Calibri" panose="020F0502020204030204" pitchFamily="34" charset="0"/>
-              </a:defRPr>
-            </a:lvl3pPr>
-            <a:lvl4pPr marL="1600200" indent="-228600">
-              <a:defRPr>
-                <a:solidFill>
-                  <a:schemeClr val="tx1"/>
-                </a:solidFill>
-                <a:latin typeface="Calibri" panose="020F0502020204030204" pitchFamily="34" charset="0"/>
-              </a:defRPr>
-            </a:lvl4pPr>
-            <a:lvl5pPr marL="2057400" indent="-228600">
-              <a:defRPr>
-                <a:solidFill>
-                  <a:schemeClr val="tx1"/>
-                </a:solidFill>
-                <a:latin typeface="Calibri" panose="020F0502020204030204" pitchFamily="34" charset="0"/>
-              </a:defRPr>
-            </a:lvl5pPr>
-            <a:lvl6pPr marL="2514600" indent="-228600" eaLnBrk="0" fontAlgn="base" hangingPunct="0">
-              <a:spcBef>
-                <a:spcPct val="0"/>
-              </a:spcBef>
-              <a:spcAft>
-                <a:spcPct val="0"/>
-              </a:spcAft>
-              <a:defRPr>
-                <a:solidFill>
-                  <a:schemeClr val="tx1"/>
-                </a:solidFill>
-                <a:latin typeface="Calibri" panose="020F0502020204030204" pitchFamily="34" charset="0"/>
-              </a:defRPr>
-            </a:lvl6pPr>
-            <a:lvl7pPr marL="2971800" indent="-228600" eaLnBrk="0" fontAlgn="base" hangingPunct="0">
-              <a:spcBef>
-                <a:spcPct val="0"/>
-              </a:spcBef>
-              <a:spcAft>
-                <a:spcPct val="0"/>
-              </a:spcAft>
-              <a:defRPr>
-                <a:solidFill>
-                  <a:schemeClr val="tx1"/>
-                </a:solidFill>
-                <a:latin typeface="Calibri" panose="020F0502020204030204" pitchFamily="34" charset="0"/>
-              </a:defRPr>
-            </a:lvl7pPr>
-            <a:lvl8pPr marL="3429000" indent="-228600" eaLnBrk="0" fontAlgn="base" hangingPunct="0">
-              <a:spcBef>
-                <a:spcPct val="0"/>
-              </a:spcBef>
-              <a:spcAft>
-                <a:spcPct val="0"/>
-              </a:spcAft>
-              <a:defRPr>
-                <a:solidFill>
-                  <a:schemeClr val="tx1"/>
-                </a:solidFill>
-                <a:latin typeface="Calibri" panose="020F0502020204030204" pitchFamily="34" charset="0"/>
-              </a:defRPr>
-            </a:lvl8pPr>
-            <a:lvl9pPr marL="3886200" indent="-228600" eaLnBrk="0" fontAlgn="base" hangingPunct="0">
-              <a:spcBef>
-                <a:spcPct val="0"/>
-              </a:spcBef>
-              <a:spcAft>
-                <a:spcPct val="0"/>
-              </a:spcAft>
-              <a:defRPr>
-                <a:solidFill>
-                  <a:schemeClr val="tx1"/>
-                </a:solidFill>
-                <a:latin typeface="Calibri" panose="020F0502020204030204" pitchFamily="34" charset="0"/>
-              </a:defRPr>
-            </a:lvl9pPr>
-          </a:lstStyle>
-          <a:p>
-            <a:pPr algn="ctr" eaLnBrk="1" hangingPunct="1"/>
-            <a:r>
-              <a:rPr lang="en-US" altLang="en-US" sz="1200" dirty="0">
-                <a:latin typeface="Arial" panose="020B0604020202020204" pitchFamily="34" charset="0"/>
-                <a:ea typeface="Amazon Ember" panose="020B0603020204020204" pitchFamily="34" charset="0"/>
-                <a:cs typeface="Arial" panose="020B0604020202020204" pitchFamily="34" charset="0"/>
-              </a:rPr>
-              <a:t>AWS Systems Manager</a:t>
-            </a:r>
-          </a:p>
-        </p:txBody>
-      </p:sp>
-      <p:pic>
-        <p:nvPicPr>
-          <p:cNvPr id="36" name="Graphic 5">
-            <a:extLst>
-              <a:ext uri="{FF2B5EF4-FFF2-40B4-BE49-F238E27FC236}">
-                <a16:creationId xmlns:a16="http://schemas.microsoft.com/office/drawing/2014/main" id="{38622D4A-AB16-E74E-A250-BDBAAFFAA603}"/>
-              </a:ext>
-            </a:extLst>
-          </p:cNvPr>
-          <p:cNvPicPr>
-            <a:picLocks noChangeAspect="1" noChangeArrowheads="1"/>
-          </p:cNvPicPr>
-          <p:nvPr/>
-        </p:nvPicPr>
-        <p:blipFill>
-          <a:blip r:embed="rId10">
-            <a:extLst>
-              <a:ext uri="{28A0092B-C50C-407E-A947-70E740481C1C}">
-                <a14:useLocalDpi xmlns:a14="http://schemas.microsoft.com/office/drawing/2010/main" val="0"/>
-              </a:ext>
-            </a:extLst>
-          </a:blip>
-          <a:srcRect/>
-          <a:stretch>
-            <a:fillRect/>
-          </a:stretch>
-        </p:blipFill>
-        <p:spPr bwMode="auto">
-          <a:xfrm>
-            <a:off x="2053965" y="2953023"/>
-            <a:ext cx="762000" cy="762000"/>
-          </a:xfrm>
-          <a:prstGeom prst="rect">
-            <a:avLst/>
-          </a:prstGeom>
-          <a:noFill/>
-          <a:ln>
-            <a:noFill/>
-          </a:ln>
-          <a:extLst>
-            <a:ext uri="{909E8E84-426E-40DD-AFC4-6F175D3DCCD1}">
-              <a14:hiddenFill xmlns:a14="http://schemas.microsoft.com/office/drawing/2010/main">
-                <a:solidFill>
-                  <a:srgbClr val="FFFFFF"/>
-                </a:solidFill>
-              </a14:hiddenFill>
-            </a:ext>
-            <a:ext uri="{91240B29-F687-4F45-9708-019B960494DF}">
-              <a14:hiddenLine xmlns:a14="http://schemas.microsoft.com/office/drawing/2010/main" w="9525">
-                <a:solidFill>
-                  <a:srgbClr val="000000"/>
-                </a:solidFill>
-                <a:miter lim="800000"/>
-                <a:headEnd/>
-                <a:tailEnd/>
-              </a14:hiddenLine>
-            </a:ext>
-          </a:extLst>
-        </p:spPr>
-      </p:pic>
-      <p:sp>
-        <p:nvSpPr>
-          <p:cNvPr id="37" name="TextBox 6">
-            <a:extLst>
-              <a:ext uri="{FF2B5EF4-FFF2-40B4-BE49-F238E27FC236}">
-                <a16:creationId xmlns:a16="http://schemas.microsoft.com/office/drawing/2014/main" id="{36FEB6A7-BBBF-BF4E-B09F-F70950BA7F04}"/>
-              </a:ext>
-            </a:extLst>
-          </p:cNvPr>
-          <p:cNvSpPr txBox="1">
-            <a:spLocks noChangeArrowheads="1"/>
-          </p:cNvSpPr>
-          <p:nvPr/>
-        </p:nvSpPr>
-        <p:spPr bwMode="auto">
-          <a:xfrm>
-            <a:off x="1284479" y="3700504"/>
-            <a:ext cx="2268537" cy="276999"/>
-          </a:xfrm>
-          <a:prstGeom prst="rect">
-            <a:avLst/>
-          </a:prstGeom>
-          <a:noFill/>
-          <a:ln>
-            <a:noFill/>
-          </a:ln>
-          <a:extLst>
-            <a:ext uri="{909E8E84-426E-40DD-AFC4-6F175D3DCCD1}">
-              <a14:hiddenFill xmlns:a14="http://schemas.microsoft.com/office/drawing/2010/main">
-                <a:solidFill>
-                  <a:srgbClr val="FFFFFF"/>
-                </a:solidFill>
-              </a14:hiddenFill>
-            </a:ext>
-            <a:ext uri="{91240B29-F687-4F45-9708-019B960494DF}">
-              <a14:hiddenLine xmlns:a14="http://schemas.microsoft.com/office/drawing/2010/main" w="9525">
-                <a:solidFill>
-                  <a:srgbClr val="000000"/>
-                </a:solidFill>
-                <a:miter lim="800000"/>
-                <a:headEnd/>
-                <a:tailEnd/>
-              </a14:hiddenLine>
-            </a:ext>
-          </a:extLst>
-        </p:spPr>
-        <p:txBody>
-          <a:bodyPr>
-            <a:spAutoFit/>
-          </a:bodyPr>
-          <a:lstStyle>
-            <a:lvl1pPr>
-              <a:defRPr>
-                <a:solidFill>
-                  <a:schemeClr val="tx1"/>
-                </a:solidFill>
-                <a:latin typeface="Calibri" panose="020F0502020204030204" pitchFamily="34" charset="0"/>
-              </a:defRPr>
-            </a:lvl1pPr>
-            <a:lvl2pPr marL="742950" indent="-285750">
-              <a:defRPr>
-                <a:solidFill>
-                  <a:schemeClr val="tx1"/>
-                </a:solidFill>
-                <a:latin typeface="Calibri" panose="020F0502020204030204" pitchFamily="34" charset="0"/>
-              </a:defRPr>
-            </a:lvl2pPr>
-            <a:lvl3pPr marL="1143000" indent="-228600">
-              <a:defRPr>
-                <a:solidFill>
-                  <a:schemeClr val="tx1"/>
-                </a:solidFill>
-                <a:latin typeface="Calibri" panose="020F0502020204030204" pitchFamily="34" charset="0"/>
-              </a:defRPr>
-            </a:lvl3pPr>
-            <a:lvl4pPr marL="1600200" indent="-228600">
-              <a:defRPr>
-                <a:solidFill>
-                  <a:schemeClr val="tx1"/>
-                </a:solidFill>
-                <a:latin typeface="Calibri" panose="020F0502020204030204" pitchFamily="34" charset="0"/>
-              </a:defRPr>
-            </a:lvl4pPr>
-            <a:lvl5pPr marL="2057400" indent="-228600">
-              <a:defRPr>
-                <a:solidFill>
-                  <a:schemeClr val="tx1"/>
-                </a:solidFill>
-                <a:latin typeface="Calibri" panose="020F0502020204030204" pitchFamily="34" charset="0"/>
-              </a:defRPr>
-            </a:lvl5pPr>
-            <a:lvl6pPr marL="2514600" indent="-228600" eaLnBrk="0" fontAlgn="base" hangingPunct="0">
-              <a:spcBef>
-                <a:spcPct val="0"/>
-              </a:spcBef>
-              <a:spcAft>
-                <a:spcPct val="0"/>
-              </a:spcAft>
-              <a:defRPr>
-                <a:solidFill>
-                  <a:schemeClr val="tx1"/>
-                </a:solidFill>
-                <a:latin typeface="Calibri" panose="020F0502020204030204" pitchFamily="34" charset="0"/>
-              </a:defRPr>
-            </a:lvl6pPr>
-            <a:lvl7pPr marL="2971800" indent="-228600" eaLnBrk="0" fontAlgn="base" hangingPunct="0">
-              <a:spcBef>
-                <a:spcPct val="0"/>
-              </a:spcBef>
-              <a:spcAft>
-                <a:spcPct val="0"/>
-              </a:spcAft>
-              <a:defRPr>
-                <a:solidFill>
-                  <a:schemeClr val="tx1"/>
-                </a:solidFill>
-                <a:latin typeface="Calibri" panose="020F0502020204030204" pitchFamily="34" charset="0"/>
-              </a:defRPr>
-            </a:lvl7pPr>
-            <a:lvl8pPr marL="3429000" indent="-228600" eaLnBrk="0" fontAlgn="base" hangingPunct="0">
-              <a:spcBef>
-                <a:spcPct val="0"/>
-              </a:spcBef>
-              <a:spcAft>
-                <a:spcPct val="0"/>
-              </a:spcAft>
-              <a:defRPr>
-                <a:solidFill>
-                  <a:schemeClr val="tx1"/>
-                </a:solidFill>
-                <a:latin typeface="Calibri" panose="020F0502020204030204" pitchFamily="34" charset="0"/>
-              </a:defRPr>
-            </a:lvl8pPr>
-            <a:lvl9pPr marL="3886200" indent="-228600" eaLnBrk="0" fontAlgn="base" hangingPunct="0">
-              <a:spcBef>
-                <a:spcPct val="0"/>
-              </a:spcBef>
-              <a:spcAft>
-                <a:spcPct val="0"/>
-              </a:spcAft>
-              <a:defRPr>
-                <a:solidFill>
-                  <a:schemeClr val="tx1"/>
-                </a:solidFill>
-                <a:latin typeface="Calibri" panose="020F0502020204030204" pitchFamily="34" charset="0"/>
-              </a:defRPr>
-            </a:lvl9pPr>
-          </a:lstStyle>
-          <a:p>
-            <a:pPr algn="ctr" eaLnBrk="1" hangingPunct="1"/>
-            <a:r>
-              <a:rPr lang="en-US" altLang="en-US" sz="1200" dirty="0">
-                <a:latin typeface="Arial" panose="020B0604020202020204" pitchFamily="34" charset="0"/>
-                <a:ea typeface="Amazon Ember" panose="020B0603020204020204" pitchFamily="34" charset="0"/>
-                <a:cs typeface="Arial" panose="020B0604020202020204" pitchFamily="34" charset="0"/>
-              </a:rPr>
-              <a:t>Amazon EC2</a:t>
-            </a:r>
-            <a:endParaRPr lang="en-US" altLang="en-US" sz="1200" dirty="0">
-              <a:latin typeface="Arial" panose="020B0604020202020204" pitchFamily="34" charset="0"/>
-              <a:ea typeface="Amazon Ember" panose="020B0603020204020204" pitchFamily="34" charset="0"/>
-              <a:cs typeface="Arial" panose="020B0604020202020204" pitchFamily="34" charset="0"/>
-            </a:endParaRPr>
-          </a:p>
-        </p:txBody>
-      </p:sp>
+          </p:spPr>
+          <p:txBody>
+            <a:bodyPr>
+              <a:spAutoFit/>
+            </a:bodyPr>
+            <a:lstStyle>
+              <a:lvl1pPr>
+                <a:defRPr>
+                  <a:solidFill>
+                    <a:schemeClr val="tx1"/>
+                  </a:solidFill>
+                  <a:latin typeface="Calibri" panose="020F0502020204030204" pitchFamily="34" charset="0"/>
+                </a:defRPr>
+              </a:lvl1pPr>
+              <a:lvl2pPr marL="742950" indent="-285750">
+                <a:defRPr>
+                  <a:solidFill>
+                    <a:schemeClr val="tx1"/>
+                  </a:solidFill>
+                  <a:latin typeface="Calibri" panose="020F0502020204030204" pitchFamily="34" charset="0"/>
+                </a:defRPr>
+              </a:lvl2pPr>
+              <a:lvl3pPr marL="1143000" indent="-228600">
+                <a:defRPr>
+                  <a:solidFill>
+                    <a:schemeClr val="tx1"/>
+                  </a:solidFill>
+                  <a:latin typeface="Calibri" panose="020F0502020204030204" pitchFamily="34" charset="0"/>
+                </a:defRPr>
+              </a:lvl3pPr>
+              <a:lvl4pPr marL="1600200" indent="-228600">
+                <a:defRPr>
+                  <a:solidFill>
+                    <a:schemeClr val="tx1"/>
+                  </a:solidFill>
+                  <a:latin typeface="Calibri" panose="020F0502020204030204" pitchFamily="34" charset="0"/>
+                </a:defRPr>
+              </a:lvl4pPr>
+              <a:lvl5pPr marL="2057400" indent="-228600">
+                <a:defRPr>
+                  <a:solidFill>
+                    <a:schemeClr val="tx1"/>
+                  </a:solidFill>
+                  <a:latin typeface="Calibri" panose="020F0502020204030204" pitchFamily="34" charset="0"/>
+                </a:defRPr>
+              </a:lvl5pPr>
+              <a:lvl6pPr marL="2514600" indent="-228600" eaLnBrk="0" fontAlgn="base" hangingPunct="0">
+                <a:spcBef>
+                  <a:spcPct val="0"/>
+                </a:spcBef>
+                <a:spcAft>
+                  <a:spcPct val="0"/>
+                </a:spcAft>
+                <a:defRPr>
+                  <a:solidFill>
+                    <a:schemeClr val="tx1"/>
+                  </a:solidFill>
+                  <a:latin typeface="Calibri" panose="020F0502020204030204" pitchFamily="34" charset="0"/>
+                </a:defRPr>
+              </a:lvl6pPr>
+              <a:lvl7pPr marL="2971800" indent="-228600" eaLnBrk="0" fontAlgn="base" hangingPunct="0">
+                <a:spcBef>
+                  <a:spcPct val="0"/>
+                </a:spcBef>
+                <a:spcAft>
+                  <a:spcPct val="0"/>
+                </a:spcAft>
+                <a:defRPr>
+                  <a:solidFill>
+                    <a:schemeClr val="tx1"/>
+                  </a:solidFill>
+                  <a:latin typeface="Calibri" panose="020F0502020204030204" pitchFamily="34" charset="0"/>
+                </a:defRPr>
+              </a:lvl7pPr>
+              <a:lvl8pPr marL="3429000" indent="-228600" eaLnBrk="0" fontAlgn="base" hangingPunct="0">
+                <a:spcBef>
+                  <a:spcPct val="0"/>
+                </a:spcBef>
+                <a:spcAft>
+                  <a:spcPct val="0"/>
+                </a:spcAft>
+                <a:defRPr>
+                  <a:solidFill>
+                    <a:schemeClr val="tx1"/>
+                  </a:solidFill>
+                  <a:latin typeface="Calibri" panose="020F0502020204030204" pitchFamily="34" charset="0"/>
+                </a:defRPr>
+              </a:lvl8pPr>
+              <a:lvl9pPr marL="3886200" indent="-228600" eaLnBrk="0" fontAlgn="base" hangingPunct="0">
+                <a:spcBef>
+                  <a:spcPct val="0"/>
+                </a:spcBef>
+                <a:spcAft>
+                  <a:spcPct val="0"/>
+                </a:spcAft>
+                <a:defRPr>
+                  <a:solidFill>
+                    <a:schemeClr val="tx1"/>
+                  </a:solidFill>
+                  <a:latin typeface="Calibri" panose="020F0502020204030204" pitchFamily="34" charset="0"/>
+                </a:defRPr>
+              </a:lvl9pPr>
+            </a:lstStyle>
+            <a:p>
+              <a:pPr algn="ctr" eaLnBrk="1" hangingPunct="1"/>
+              <a:r>
+                <a:rPr lang="en-US" altLang="en-US" sz="1200" dirty="0">
+                  <a:latin typeface="Arial" panose="020B0604020202020204" pitchFamily="34" charset="0"/>
+                  <a:ea typeface="Amazon Ember" panose="020B0603020204020204" pitchFamily="34" charset="0"/>
+                  <a:cs typeface="Arial" panose="020B0604020202020204" pitchFamily="34" charset="0"/>
+                </a:rPr>
+                <a:t>AWS Systems Manager</a:t>
+              </a:r>
+            </a:p>
+          </p:txBody>
+        </p:sp>
+      </p:grpSp>
       <p:pic>
         <p:nvPicPr>
           <p:cNvPr id="38" name="Graphic 13">
@@ -6851,7 +6655,7 @@
           <p:nvPr/>
         </p:nvPicPr>
         <p:blipFill>
-          <a:blip r:embed="rId11">
+          <a:blip r:embed="rId10">
             <a:extLst>
               <a:ext uri="{28A0092B-C50C-407E-A947-70E740481C1C}">
                 <a14:useLocalDpi xmlns:a14="http://schemas.microsoft.com/office/drawing/2010/main" val="0"/>
@@ -6911,7 +6715,7 @@
           <p:nvPr/>
         </p:nvPicPr>
         <p:blipFill>
-          <a:blip r:embed="rId11">
+          <a:blip r:embed="rId10">
             <a:extLst>
               <a:ext uri="{28A0092B-C50C-407E-A947-70E740481C1C}">
                 <a14:useLocalDpi xmlns:a14="http://schemas.microsoft.com/office/drawing/2010/main" val="0"/>
@@ -6956,227 +6760,242 @@
           </a:extLst>
         </p:spPr>
       </p:pic>
-      <p:pic>
-        <p:nvPicPr>
-          <p:cNvPr id="40" name="Graphic 19">
+      <p:grpSp>
+        <p:nvGrpSpPr>
+          <p:cNvPr id="11" name="Group 10"/>
+          <p:cNvGrpSpPr/>
+          <p:nvPr/>
+        </p:nvGrpSpPr>
+        <p:grpSpPr>
+          <a:xfrm>
+            <a:off x="2834433" y="2910805"/>
+            <a:ext cx="2292350" cy="1021535"/>
+            <a:chOff x="4613551" y="2958177"/>
+            <a:chExt cx="2292350" cy="1021535"/>
+          </a:xfrm>
+        </p:grpSpPr>
+        <p:pic>
+          <p:nvPicPr>
+            <p:cNvPr id="40" name="Graphic 19">
+              <a:extLst>
+                <a:ext uri="{FF2B5EF4-FFF2-40B4-BE49-F238E27FC236}">
+                  <a16:creationId xmlns:a16="http://schemas.microsoft.com/office/drawing/2014/main" id="{820E96C4-59EB-2648-98B1-156ACC2C9039}"/>
+                </a:ext>
+              </a:extLst>
+            </p:cNvPr>
+            <p:cNvPicPr>
+              <a:picLocks noChangeAspect="1" noChangeArrowheads="1"/>
+            </p:cNvPicPr>
+            <p:nvPr/>
+          </p:nvPicPr>
+          <p:blipFill>
+            <a:blip r:embed="rId11">
+              <a:extLst>
+                <a:ext uri="{28A0092B-C50C-407E-A947-70E740481C1C}">
+                  <a14:useLocalDpi xmlns:a14="http://schemas.microsoft.com/office/drawing/2010/main" val="0"/>
+                </a:ext>
+              </a:extLst>
+            </a:blip>
+            <a:srcRect/>
+            <a:stretch>
+              <a:fillRect/>
+            </a:stretch>
+          </p:blipFill>
+          <p:spPr bwMode="auto">
+            <a:xfrm>
+              <a:off x="5425026" y="2958177"/>
+              <a:ext cx="762000" cy="762000"/>
+            </a:xfrm>
+            <a:prstGeom prst="rect">
+              <a:avLst/>
+            </a:prstGeom>
+            <a:noFill/>
+            <a:ln>
+              <a:noFill/>
+            </a:ln>
             <a:extLst>
-              <a:ext uri="{FF2B5EF4-FFF2-40B4-BE49-F238E27FC236}">
-                <a16:creationId xmlns:a16="http://schemas.microsoft.com/office/drawing/2014/main" id="{820E96C4-59EB-2648-98B1-156ACC2C9039}"/>
+              <a:ext uri="{909E8E84-426E-40DD-AFC4-6F175D3DCCD1}">
+                <a14:hiddenFill xmlns:a14="http://schemas.microsoft.com/office/drawing/2010/main">
+                  <a:solidFill>
+                    <a:srgbClr val="FFFFFF"/>
+                  </a:solidFill>
+                </a14:hiddenFill>
+              </a:ext>
+              <a:ext uri="{91240B29-F687-4F45-9708-019B960494DF}">
+                <a14:hiddenLine xmlns:a14="http://schemas.microsoft.com/office/drawing/2010/main" w="9525">
+                  <a:solidFill>
+                    <a:srgbClr val="000000"/>
+                  </a:solidFill>
+                  <a:miter lim="800000"/>
+                  <a:headEnd/>
+                  <a:tailEnd/>
+                </a14:hiddenLine>
               </a:ext>
             </a:extLst>
-          </p:cNvPr>
-          <p:cNvPicPr>
-            <a:picLocks noChangeAspect="1" noChangeArrowheads="1"/>
-          </p:cNvPicPr>
-          <p:nvPr/>
-        </p:nvPicPr>
-        <p:blipFill>
-          <a:blip r:embed="rId12">
+          </p:spPr>
+        </p:pic>
+        <p:sp>
+          <p:nvSpPr>
+            <p:cNvPr id="41" name="TextBox 11">
+              <a:extLst>
+                <a:ext uri="{FF2B5EF4-FFF2-40B4-BE49-F238E27FC236}">
+                  <a16:creationId xmlns:a16="http://schemas.microsoft.com/office/drawing/2014/main" id="{C9BB1F7E-248D-424E-8B74-0C0C9C2B1E04}"/>
+                </a:ext>
+              </a:extLst>
+            </p:cNvPr>
+            <p:cNvSpPr txBox="1">
+              <a:spLocks noChangeArrowheads="1"/>
+            </p:cNvSpPr>
+            <p:nvPr/>
+          </p:nvSpPr>
+          <p:spPr bwMode="auto">
+            <a:xfrm>
+              <a:off x="4613551" y="3702713"/>
+              <a:ext cx="2292350" cy="276999"/>
+            </a:xfrm>
+            <a:prstGeom prst="rect">
+              <a:avLst/>
+            </a:prstGeom>
+            <a:noFill/>
+            <a:ln>
+              <a:noFill/>
+            </a:ln>
             <a:extLst>
-              <a:ext uri="{28A0092B-C50C-407E-A947-70E740481C1C}">
-                <a14:useLocalDpi xmlns:a14="http://schemas.microsoft.com/office/drawing/2010/main" val="0"/>
+              <a:ext uri="{909E8E84-426E-40DD-AFC4-6F175D3DCCD1}">
+                <a14:hiddenFill xmlns:a14="http://schemas.microsoft.com/office/drawing/2010/main">
+                  <a:solidFill>
+                    <a:srgbClr val="FFFFFF"/>
+                  </a:solidFill>
+                </a14:hiddenFill>
+              </a:ext>
+              <a:ext uri="{91240B29-F687-4F45-9708-019B960494DF}">
+                <a14:hiddenLine xmlns:a14="http://schemas.microsoft.com/office/drawing/2010/main" w="9525">
+                  <a:solidFill>
+                    <a:srgbClr val="000000"/>
+                  </a:solidFill>
+                  <a:miter lim="800000"/>
+                  <a:headEnd/>
+                  <a:tailEnd/>
+                </a14:hiddenLine>
               </a:ext>
             </a:extLst>
-          </a:blip>
-          <a:srcRect/>
-          <a:stretch>
-            <a:fillRect/>
-          </a:stretch>
-        </p:blipFill>
-        <p:spPr bwMode="auto">
-          <a:xfrm>
-            <a:off x="5425026" y="2958177"/>
-            <a:ext cx="762000" cy="762000"/>
-          </a:xfrm>
-          <a:prstGeom prst="rect">
-            <a:avLst/>
-          </a:prstGeom>
-          <a:noFill/>
-          <a:ln>
-            <a:noFill/>
-          </a:ln>
-          <a:extLst>
-            <a:ext uri="{909E8E84-426E-40DD-AFC4-6F175D3DCCD1}">
-              <a14:hiddenFill xmlns:a14="http://schemas.microsoft.com/office/drawing/2010/main">
-                <a:solidFill>
-                  <a:srgbClr val="FFFFFF"/>
-                </a:solidFill>
-              </a14:hiddenFill>
-            </a:ext>
-            <a:ext uri="{91240B29-F687-4F45-9708-019B960494DF}">
-              <a14:hiddenLine xmlns:a14="http://schemas.microsoft.com/office/drawing/2010/main" w="9525">
-                <a:solidFill>
-                  <a:srgbClr val="000000"/>
-                </a:solidFill>
-                <a:miter lim="800000"/>
-                <a:headEnd/>
-                <a:tailEnd/>
-              </a14:hiddenLine>
-            </a:ext>
-          </a:extLst>
-        </p:spPr>
-      </p:pic>
-      <p:sp>
-        <p:nvSpPr>
-          <p:cNvPr id="41" name="TextBox 11">
-            <a:extLst>
-              <a:ext uri="{FF2B5EF4-FFF2-40B4-BE49-F238E27FC236}">
-                <a16:creationId xmlns:a16="http://schemas.microsoft.com/office/drawing/2014/main" id="{C9BB1F7E-248D-424E-8B74-0C0C9C2B1E04}"/>
-              </a:ext>
-            </a:extLst>
-          </p:cNvPr>
-          <p:cNvSpPr txBox="1">
-            <a:spLocks noChangeArrowheads="1"/>
-          </p:cNvSpPr>
-          <p:nvPr/>
-        </p:nvSpPr>
-        <p:spPr bwMode="auto">
-          <a:xfrm>
-            <a:off x="4613551" y="3702713"/>
-            <a:ext cx="2292350" cy="276999"/>
-          </a:xfrm>
-          <a:prstGeom prst="rect">
-            <a:avLst/>
-          </a:prstGeom>
-          <a:noFill/>
-          <a:ln>
-            <a:noFill/>
-          </a:ln>
-          <a:extLst>
-            <a:ext uri="{909E8E84-426E-40DD-AFC4-6F175D3DCCD1}">
-              <a14:hiddenFill xmlns:a14="http://schemas.microsoft.com/office/drawing/2010/main">
-                <a:solidFill>
-                  <a:srgbClr val="FFFFFF"/>
-                </a:solidFill>
-              </a14:hiddenFill>
-            </a:ext>
-            <a:ext uri="{91240B29-F687-4F45-9708-019B960494DF}">
-              <a14:hiddenLine xmlns:a14="http://schemas.microsoft.com/office/drawing/2010/main" w="9525">
-                <a:solidFill>
-                  <a:srgbClr val="000000"/>
-                </a:solidFill>
-                <a:miter lim="800000"/>
-                <a:headEnd/>
-                <a:tailEnd/>
-              </a14:hiddenLine>
-            </a:ext>
-          </a:extLst>
-        </p:spPr>
-        <p:txBody>
-          <a:bodyPr>
-            <a:spAutoFit/>
-          </a:bodyPr>
-          <a:lstStyle>
-            <a:lvl1pPr>
-              <a:defRPr>
-                <a:solidFill>
-                  <a:schemeClr val="tx1"/>
-                </a:solidFill>
-                <a:latin typeface="Calibri" panose="020F0502020204030204" pitchFamily="34" charset="0"/>
-              </a:defRPr>
-            </a:lvl1pPr>
-            <a:lvl2pPr marL="742950" indent="-285750">
-              <a:defRPr>
-                <a:solidFill>
-                  <a:schemeClr val="tx1"/>
-                </a:solidFill>
-                <a:latin typeface="Calibri" panose="020F0502020204030204" pitchFamily="34" charset="0"/>
-              </a:defRPr>
-            </a:lvl2pPr>
-            <a:lvl3pPr marL="1143000" indent="-228600">
-              <a:defRPr>
-                <a:solidFill>
-                  <a:schemeClr val="tx1"/>
-                </a:solidFill>
-                <a:latin typeface="Calibri" panose="020F0502020204030204" pitchFamily="34" charset="0"/>
-              </a:defRPr>
-            </a:lvl3pPr>
-            <a:lvl4pPr marL="1600200" indent="-228600">
-              <a:defRPr>
-                <a:solidFill>
-                  <a:schemeClr val="tx1"/>
-                </a:solidFill>
-                <a:latin typeface="Calibri" panose="020F0502020204030204" pitchFamily="34" charset="0"/>
-              </a:defRPr>
-            </a:lvl4pPr>
-            <a:lvl5pPr marL="2057400" indent="-228600">
-              <a:defRPr>
-                <a:solidFill>
-                  <a:schemeClr val="tx1"/>
-                </a:solidFill>
-                <a:latin typeface="Calibri" panose="020F0502020204030204" pitchFamily="34" charset="0"/>
-              </a:defRPr>
-            </a:lvl5pPr>
-            <a:lvl6pPr marL="2514600" indent="-228600" eaLnBrk="0" fontAlgn="base" hangingPunct="0">
-              <a:spcBef>
-                <a:spcPct val="0"/>
-              </a:spcBef>
-              <a:spcAft>
-                <a:spcPct val="0"/>
-              </a:spcAft>
-              <a:defRPr>
-                <a:solidFill>
-                  <a:schemeClr val="tx1"/>
-                </a:solidFill>
-                <a:latin typeface="Calibri" panose="020F0502020204030204" pitchFamily="34" charset="0"/>
-              </a:defRPr>
-            </a:lvl6pPr>
-            <a:lvl7pPr marL="2971800" indent="-228600" eaLnBrk="0" fontAlgn="base" hangingPunct="0">
-              <a:spcBef>
-                <a:spcPct val="0"/>
-              </a:spcBef>
-              <a:spcAft>
-                <a:spcPct val="0"/>
-              </a:spcAft>
-              <a:defRPr>
-                <a:solidFill>
-                  <a:schemeClr val="tx1"/>
-                </a:solidFill>
-                <a:latin typeface="Calibri" panose="020F0502020204030204" pitchFamily="34" charset="0"/>
-              </a:defRPr>
-            </a:lvl7pPr>
-            <a:lvl8pPr marL="3429000" indent="-228600" eaLnBrk="0" fontAlgn="base" hangingPunct="0">
-              <a:spcBef>
-                <a:spcPct val="0"/>
-              </a:spcBef>
-              <a:spcAft>
-                <a:spcPct val="0"/>
-              </a:spcAft>
-              <a:defRPr>
-                <a:solidFill>
-                  <a:schemeClr val="tx1"/>
-                </a:solidFill>
-                <a:latin typeface="Calibri" panose="020F0502020204030204" pitchFamily="34" charset="0"/>
-              </a:defRPr>
-            </a:lvl8pPr>
-            <a:lvl9pPr marL="3886200" indent="-228600" eaLnBrk="0" fontAlgn="base" hangingPunct="0">
-              <a:spcBef>
-                <a:spcPct val="0"/>
-              </a:spcBef>
-              <a:spcAft>
-                <a:spcPct val="0"/>
-              </a:spcAft>
-              <a:defRPr>
-                <a:solidFill>
-                  <a:schemeClr val="tx1"/>
-                </a:solidFill>
-                <a:latin typeface="Calibri" panose="020F0502020204030204" pitchFamily="34" charset="0"/>
-              </a:defRPr>
-            </a:lvl9pPr>
-          </a:lstStyle>
-          <a:p>
-            <a:pPr algn="ctr" eaLnBrk="1" hangingPunct="1"/>
-            <a:r>
-              <a:rPr lang="en-US" altLang="en-US" sz="1200" dirty="0">
-                <a:latin typeface="Arial" panose="020B0604020202020204" pitchFamily="34" charset="0"/>
-                <a:ea typeface="Amazon Ember" panose="020B0603020204020204" pitchFamily="34" charset="0"/>
-                <a:cs typeface="Arial" panose="020B0604020202020204" pitchFamily="34" charset="0"/>
-              </a:rPr>
-              <a:t>Amazon EventBridge</a:t>
-            </a:r>
-          </a:p>
-        </p:txBody>
-      </p:sp>
+          </p:spPr>
+          <p:txBody>
+            <a:bodyPr>
+              <a:spAutoFit/>
+            </a:bodyPr>
+            <a:lstStyle>
+              <a:lvl1pPr>
+                <a:defRPr>
+                  <a:solidFill>
+                    <a:schemeClr val="tx1"/>
+                  </a:solidFill>
+                  <a:latin typeface="Calibri" panose="020F0502020204030204" pitchFamily="34" charset="0"/>
+                </a:defRPr>
+              </a:lvl1pPr>
+              <a:lvl2pPr marL="742950" indent="-285750">
+                <a:defRPr>
+                  <a:solidFill>
+                    <a:schemeClr val="tx1"/>
+                  </a:solidFill>
+                  <a:latin typeface="Calibri" panose="020F0502020204030204" pitchFamily="34" charset="0"/>
+                </a:defRPr>
+              </a:lvl2pPr>
+              <a:lvl3pPr marL="1143000" indent="-228600">
+                <a:defRPr>
+                  <a:solidFill>
+                    <a:schemeClr val="tx1"/>
+                  </a:solidFill>
+                  <a:latin typeface="Calibri" panose="020F0502020204030204" pitchFamily="34" charset="0"/>
+                </a:defRPr>
+              </a:lvl3pPr>
+              <a:lvl4pPr marL="1600200" indent="-228600">
+                <a:defRPr>
+                  <a:solidFill>
+                    <a:schemeClr val="tx1"/>
+                  </a:solidFill>
+                  <a:latin typeface="Calibri" panose="020F0502020204030204" pitchFamily="34" charset="0"/>
+                </a:defRPr>
+              </a:lvl4pPr>
+              <a:lvl5pPr marL="2057400" indent="-228600">
+                <a:defRPr>
+                  <a:solidFill>
+                    <a:schemeClr val="tx1"/>
+                  </a:solidFill>
+                  <a:latin typeface="Calibri" panose="020F0502020204030204" pitchFamily="34" charset="0"/>
+                </a:defRPr>
+              </a:lvl5pPr>
+              <a:lvl6pPr marL="2514600" indent="-228600" eaLnBrk="0" fontAlgn="base" hangingPunct="0">
+                <a:spcBef>
+                  <a:spcPct val="0"/>
+                </a:spcBef>
+                <a:spcAft>
+                  <a:spcPct val="0"/>
+                </a:spcAft>
+                <a:defRPr>
+                  <a:solidFill>
+                    <a:schemeClr val="tx1"/>
+                  </a:solidFill>
+                  <a:latin typeface="Calibri" panose="020F0502020204030204" pitchFamily="34" charset="0"/>
+                </a:defRPr>
+              </a:lvl6pPr>
+              <a:lvl7pPr marL="2971800" indent="-228600" eaLnBrk="0" fontAlgn="base" hangingPunct="0">
+                <a:spcBef>
+                  <a:spcPct val="0"/>
+                </a:spcBef>
+                <a:spcAft>
+                  <a:spcPct val="0"/>
+                </a:spcAft>
+                <a:defRPr>
+                  <a:solidFill>
+                    <a:schemeClr val="tx1"/>
+                  </a:solidFill>
+                  <a:latin typeface="Calibri" panose="020F0502020204030204" pitchFamily="34" charset="0"/>
+                </a:defRPr>
+              </a:lvl7pPr>
+              <a:lvl8pPr marL="3429000" indent="-228600" eaLnBrk="0" fontAlgn="base" hangingPunct="0">
+                <a:spcBef>
+                  <a:spcPct val="0"/>
+                </a:spcBef>
+                <a:spcAft>
+                  <a:spcPct val="0"/>
+                </a:spcAft>
+                <a:defRPr>
+                  <a:solidFill>
+                    <a:schemeClr val="tx1"/>
+                  </a:solidFill>
+                  <a:latin typeface="Calibri" panose="020F0502020204030204" pitchFamily="34" charset="0"/>
+                </a:defRPr>
+              </a:lvl8pPr>
+              <a:lvl9pPr marL="3886200" indent="-228600" eaLnBrk="0" fontAlgn="base" hangingPunct="0">
+                <a:spcBef>
+                  <a:spcPct val="0"/>
+                </a:spcBef>
+                <a:spcAft>
+                  <a:spcPct val="0"/>
+                </a:spcAft>
+                <a:defRPr>
+                  <a:solidFill>
+                    <a:schemeClr val="tx1"/>
+                  </a:solidFill>
+                  <a:latin typeface="Calibri" panose="020F0502020204030204" pitchFamily="34" charset="0"/>
+                </a:defRPr>
+              </a:lvl9pPr>
+            </a:lstStyle>
+            <a:p>
+              <a:pPr algn="ctr" eaLnBrk="1" hangingPunct="1"/>
+              <a:r>
+                <a:rPr lang="en-US" altLang="en-US" sz="1200" dirty="0">
+                  <a:latin typeface="Arial" panose="020B0604020202020204" pitchFamily="34" charset="0"/>
+                  <a:ea typeface="Amazon Ember" panose="020B0603020204020204" pitchFamily="34" charset="0"/>
+                  <a:cs typeface="Arial" panose="020B0604020202020204" pitchFamily="34" charset="0"/>
+                </a:rPr>
+                <a:t>Amazon EventBridge</a:t>
+              </a:r>
+            </a:p>
+          </p:txBody>
+        </p:sp>
+      </p:grpSp>
       <p:pic>
         <p:nvPicPr>
           <p:cNvPr id="42" name="Graphic 24">
@@ -7192,7 +7011,7 @@
           <p:nvPr/>
         </p:nvPicPr>
         <p:blipFill>
-          <a:blip r:embed="rId13">
+          <a:blip r:embed="rId12">
             <a:extLst>
               <a:ext uri="{28A0092B-C50C-407E-A947-70E740481C1C}">
                 <a14:useLocalDpi xmlns:a14="http://schemas.microsoft.com/office/drawing/2010/main" val="0"/>
@@ -7252,7 +7071,7 @@
           <p:nvPr/>
         </p:nvPicPr>
         <p:blipFill>
-          <a:blip r:embed="rId14">
+          <a:blip r:embed="rId13">
             <a:extLst>
               <a:ext uri="{28A0092B-C50C-407E-A947-70E740481C1C}">
                 <a14:useLocalDpi xmlns:a14="http://schemas.microsoft.com/office/drawing/2010/main" val="0"/>
@@ -7266,7 +7085,7 @@
         </p:blipFill>
         <p:spPr bwMode="auto">
           <a:xfrm>
-            <a:off x="8458200" y="522221"/>
+            <a:off x="7234289" y="2914580"/>
             <a:ext cx="762000" cy="762000"/>
           </a:xfrm>
           <a:prstGeom prst="rect">
@@ -7313,7 +7132,7 @@
         </p:nvSpPr>
         <p:spPr bwMode="auto">
           <a:xfrm>
-            <a:off x="7697726" y="1311300"/>
+            <a:off x="6469114" y="3658548"/>
             <a:ext cx="2292350" cy="276999"/>
           </a:xfrm>
           <a:prstGeom prst="rect">
@@ -7551,7 +7370,7 @@
             <p:nvPr/>
           </p:nvPicPr>
           <p:blipFill>
-            <a:blip r:embed="rId15">
+            <a:blip r:embed="rId14">
               <a:extLst>
                 <a:ext uri="{28A0092B-C50C-407E-A947-70E740481C1C}">
                   <a14:useLocalDpi xmlns:a14="http://schemas.microsoft.com/office/drawing/2010/main" val="0"/>
@@ -7745,7 +7564,7 @@
           <p:nvPr/>
         </p:nvPicPr>
         <p:blipFill>
-          <a:blip r:embed="rId16">
+          <a:blip r:embed="rId15">
             <a:extLst>
               <a:ext uri="{28A0092B-C50C-407E-A947-70E740481C1C}">
                 <a14:useLocalDpi xmlns:a14="http://schemas.microsoft.com/office/drawing/2010/main" val="0"/>

</xml_diff>

<commit_message>
Daniel and Acrolinx feedback
</commit_message>
<xml_diff>
--- a/docs/images/new-relic-architecture-diagram.pptx
+++ b/docs/images/new-relic-architecture-diagram.pptx
@@ -5613,11 +5613,7 @@
             <a:pPr algn="ctr"/>
             <a:r>
               <a:rPr lang="en" sz="1200" dirty="0"/>
-              <a:t>EventBridge </a:t>
-            </a:r>
-            <a:r>
-              <a:rPr lang="en" sz="1200" dirty="0"/>
-              <a:t>rule</a:t>
+              <a:t>EventBridge rule</a:t>
             </a:r>
             <a:endParaRPr sz="1200" dirty="0"/>
           </a:p>
@@ -5718,8 +5714,12 @@
           <a:p>
             <a:pPr algn="ctr"/>
             <a:r>
+              <a:rPr lang="en" sz="1200" dirty="0" smtClean="0"/>
+              <a:t>Systems </a:t>
+            </a:r>
+            <a:r>
               <a:rPr lang="en" sz="1200" dirty="0"/>
-              <a:t>System Manager Automation runbook</a:t>
+              <a:t>Manager Automation runbook</a:t>
             </a:r>
             <a:endParaRPr sz="1200" dirty="0"/>
           </a:p>
@@ -5753,15 +5753,7 @@
             <a:pPr algn="ctr"/>
             <a:r>
               <a:rPr lang="en" sz="1200" dirty="0"/>
-              <a:t>Systems Manager Command </a:t>
-            </a:r>
-            <a:r>
-              <a:rPr lang="en" sz="1200" dirty="0"/>
-              <a:t>d</a:t>
-            </a:r>
-            <a:r>
-              <a:rPr lang="en" sz="1200" dirty="0"/>
-              <a:t>ocument</a:t>
+              <a:t>Systems Manager Command document</a:t>
             </a:r>
             <a:endParaRPr sz="1200" dirty="0"/>
           </a:p>
@@ -5798,20 +5790,8 @@
               <a:t>Systems Manager </a:t>
             </a:r>
             <a:r>
-              <a:rPr lang="en" sz="1200" dirty="0"/>
-              <a:t>Automation </a:t>
-            </a:r>
-            <a:r>
-              <a:rPr lang="en" sz="1200" dirty="0"/>
-              <a:t>execution </a:t>
-            </a:r>
-            <a:r>
-              <a:rPr lang="en" sz="1200" dirty="0"/>
-              <a:t>r</a:t>
-            </a:r>
-            <a:r>
-              <a:rPr lang="en" sz="1200" dirty="0"/>
-              <a:t>ole</a:t>
+              <a:rPr lang="en" sz="1200" dirty="0" smtClean="0"/>
+              <a:t>Automation execution IAM role</a:t>
             </a:r>
             <a:endParaRPr sz="1200" dirty="0"/>
           </a:p>
@@ -6266,11 +6246,6 @@
                 </a:rPr>
                 <a:t>AWS IAM</a:t>
               </a:r>
-              <a:endParaRPr lang="en-US" altLang="en-US" sz="1200" dirty="0">
-                <a:latin typeface="Arial" panose="020B0604020202020204" pitchFamily="34" charset="0"/>
-                <a:ea typeface="Amazon Ember" panose="020B0603020204020204" pitchFamily="34" charset="0"/>
-                <a:cs typeface="Arial" panose="020B0604020202020204" pitchFamily="34" charset="0"/>
-              </a:endParaRPr>
             </a:p>
           </p:txBody>
         </p:sp>
@@ -7767,11 +7742,6 @@
               </a:rPr>
               <a:t>New Relic license key</a:t>
             </a:r>
-            <a:endParaRPr lang="en-US" altLang="en-US" sz="1200" dirty="0">
-              <a:latin typeface="Arial" panose="020B0604020202020204" pitchFamily="34" charset="0"/>
-              <a:ea typeface="Amazon Ember" panose="020B0603020204020204" pitchFamily="34" charset="0"/>
-              <a:cs typeface="Arial" panose="020B0604020202020204" pitchFamily="34" charset="0"/>
-            </a:endParaRPr>
           </a:p>
         </p:txBody>
       </p:sp>

</xml_diff>

<commit_message>
Production doc builds - 2021/02/22 15:55:12 UTC
</commit_message>
<xml_diff>
--- a/docs/images/new-relic-architecture-diagram.pptx
+++ b/docs/images/new-relic-architecture-diagram.pptx
@@ -5613,11 +5613,7 @@
             <a:pPr algn="ctr"/>
             <a:r>
               <a:rPr lang="en" sz="1200" dirty="0"/>
-              <a:t>EventBridge </a:t>
-            </a:r>
-            <a:r>
-              <a:rPr lang="en" sz="1200" dirty="0"/>
-              <a:t>rule</a:t>
+              <a:t>EventBridge rule</a:t>
             </a:r>
             <a:endParaRPr sz="1200" dirty="0"/>
           </a:p>
@@ -5718,8 +5714,12 @@
           <a:p>
             <a:pPr algn="ctr"/>
             <a:r>
+              <a:rPr lang="en" sz="1200" dirty="0" smtClean="0"/>
+              <a:t>Systems </a:t>
+            </a:r>
+            <a:r>
               <a:rPr lang="en" sz="1200" dirty="0"/>
-              <a:t>System Manager Automation runbook</a:t>
+              <a:t>Manager Automation runbook</a:t>
             </a:r>
             <a:endParaRPr sz="1200" dirty="0"/>
           </a:p>
@@ -5753,15 +5753,7 @@
             <a:pPr algn="ctr"/>
             <a:r>
               <a:rPr lang="en" sz="1200" dirty="0"/>
-              <a:t>Systems Manager Command </a:t>
-            </a:r>
-            <a:r>
-              <a:rPr lang="en" sz="1200" dirty="0"/>
-              <a:t>d</a:t>
-            </a:r>
-            <a:r>
-              <a:rPr lang="en" sz="1200" dirty="0"/>
-              <a:t>ocument</a:t>
+              <a:t>Systems Manager Command document</a:t>
             </a:r>
             <a:endParaRPr sz="1200" dirty="0"/>
           </a:p>
@@ -5798,20 +5790,8 @@
               <a:t>Systems Manager </a:t>
             </a:r>
             <a:r>
-              <a:rPr lang="en" sz="1200" dirty="0"/>
-              <a:t>Automation </a:t>
-            </a:r>
-            <a:r>
-              <a:rPr lang="en" sz="1200" dirty="0"/>
-              <a:t>execution </a:t>
-            </a:r>
-            <a:r>
-              <a:rPr lang="en" sz="1200" dirty="0"/>
-              <a:t>r</a:t>
-            </a:r>
-            <a:r>
-              <a:rPr lang="en" sz="1200" dirty="0"/>
-              <a:t>ole</a:t>
+              <a:rPr lang="en" sz="1200" dirty="0" smtClean="0"/>
+              <a:t>Automation execution IAM role</a:t>
             </a:r>
             <a:endParaRPr sz="1200" dirty="0"/>
           </a:p>
@@ -6266,11 +6246,6 @@
                 </a:rPr>
                 <a:t>AWS IAM</a:t>
               </a:r>
-              <a:endParaRPr lang="en-US" altLang="en-US" sz="1200" dirty="0">
-                <a:latin typeface="Arial" panose="020B0604020202020204" pitchFamily="34" charset="0"/>
-                <a:ea typeface="Amazon Ember" panose="020B0603020204020204" pitchFamily="34" charset="0"/>
-                <a:cs typeface="Arial" panose="020B0604020202020204" pitchFamily="34" charset="0"/>
-              </a:endParaRPr>
             </a:p>
           </p:txBody>
         </p:sp>
@@ -7767,11 +7742,6 @@
               </a:rPr>
               <a:t>New Relic license key</a:t>
             </a:r>
-            <a:endParaRPr lang="en-US" altLang="en-US" sz="1200" dirty="0">
-              <a:latin typeface="Arial" panose="020B0604020202020204" pitchFamily="34" charset="0"/>
-              <a:ea typeface="Amazon Ember" panose="020B0603020204020204" pitchFamily="34" charset="0"/>
-              <a:cs typeface="Arial" panose="020B0604020202020204" pitchFamily="34" charset="0"/>
-            </a:endParaRPr>
           </a:p>
         </p:txBody>
       </p:sp>

</xml_diff>

<commit_message>
Production doc builds - 2021/02/23 18:14:19 UTC
</commit_message>
<xml_diff>
--- a/docs/images/new-relic-architecture-diagram.pptx
+++ b/docs/images/new-relic-architecture-diagram.pptx
@@ -5647,7 +5647,7 @@
             <a:pPr algn="ctr"/>
             <a:r>
               <a:rPr lang="en-US" sz="1200" dirty="0" smtClean="0"/>
-              <a:t>Filter instance tag</a:t>
+              <a:t>Pass instance ID</a:t>
             </a:r>
             <a:endParaRPr sz="1200" dirty="0"/>
           </a:p>
@@ -6327,15 +6327,6 @@
         <p:blipFill>
           <a:blip r:embed="rId7">
             <a:extLst>
-              <a:ext uri="{BEBA8EAE-BF5A-486C-A8C5-ECC9F3942E4B}">
-                <a14:imgProps xmlns:a14="http://schemas.microsoft.com/office/drawing/2010/main">
-                  <a14:imgLayer r:embed="rId8">
-                    <a14:imgEffect>
-                      <a14:artisticBlur/>
-                    </a14:imgEffect>
-                  </a14:imgLayer>
-                </a14:imgProps>
-              </a:ext>
               <a:ext uri="{28A0092B-C50C-407E-A947-70E740481C1C}">
                 <a14:useLocalDpi xmlns:a14="http://schemas.microsoft.com/office/drawing/2010/main" val="0"/>
               </a:ext>
@@ -6408,7 +6399,7 @@
             <p:nvPr/>
           </p:nvPicPr>
           <p:blipFill>
-            <a:blip r:embed="rId9">
+            <a:blip r:embed="rId8">
               <a:extLst>
                 <a:ext uri="{28A0092B-C50C-407E-A947-70E740481C1C}">
                   <a14:useLocalDpi xmlns:a14="http://schemas.microsoft.com/office/drawing/2010/main" val="0"/>
@@ -6630,7 +6621,7 @@
           <p:nvPr/>
         </p:nvPicPr>
         <p:blipFill>
-          <a:blip r:embed="rId10">
+          <a:blip r:embed="rId9">
             <a:extLst>
               <a:ext uri="{28A0092B-C50C-407E-A947-70E740481C1C}">
                 <a14:useLocalDpi xmlns:a14="http://schemas.microsoft.com/office/drawing/2010/main" val="0"/>
@@ -6690,7 +6681,7 @@
           <p:nvPr/>
         </p:nvPicPr>
         <p:blipFill>
-          <a:blip r:embed="rId10">
+          <a:blip r:embed="rId9">
             <a:extLst>
               <a:ext uri="{28A0092B-C50C-407E-A947-70E740481C1C}">
                 <a14:useLocalDpi xmlns:a14="http://schemas.microsoft.com/office/drawing/2010/main" val="0"/>
@@ -6764,7 +6755,7 @@
             <p:nvPr/>
           </p:nvPicPr>
           <p:blipFill>
-            <a:blip r:embed="rId11">
+            <a:blip r:embed="rId10">
               <a:extLst>
                 <a:ext uri="{28A0092B-C50C-407E-A947-70E740481C1C}">
                   <a14:useLocalDpi xmlns:a14="http://schemas.microsoft.com/office/drawing/2010/main" val="0"/>
@@ -6986,7 +6977,7 @@
           <p:nvPr/>
         </p:nvPicPr>
         <p:blipFill>
-          <a:blip r:embed="rId12">
+          <a:blip r:embed="rId11">
             <a:extLst>
               <a:ext uri="{28A0092B-C50C-407E-A947-70E740481C1C}">
                 <a14:useLocalDpi xmlns:a14="http://schemas.microsoft.com/office/drawing/2010/main" val="0"/>
@@ -7046,7 +7037,7 @@
           <p:nvPr/>
         </p:nvPicPr>
         <p:blipFill>
-          <a:blip r:embed="rId13">
+          <a:blip r:embed="rId12">
             <a:extLst>
               <a:ext uri="{28A0092B-C50C-407E-A947-70E740481C1C}">
                 <a14:useLocalDpi xmlns:a14="http://schemas.microsoft.com/office/drawing/2010/main" val="0"/>
@@ -7345,7 +7336,7 @@
             <p:nvPr/>
           </p:nvPicPr>
           <p:blipFill>
-            <a:blip r:embed="rId14">
+            <a:blip r:embed="rId13">
               <a:extLst>
                 <a:ext uri="{28A0092B-C50C-407E-A947-70E740481C1C}">
                   <a14:useLocalDpi xmlns:a14="http://schemas.microsoft.com/office/drawing/2010/main" val="0"/>
@@ -7539,7 +7530,7 @@
           <p:nvPr/>
         </p:nvPicPr>
         <p:blipFill>
-          <a:blip r:embed="rId15">
+          <a:blip r:embed="rId14">
             <a:extLst>
               <a:ext uri="{28A0092B-C50C-407E-A947-70E740481C1C}">
                 <a14:useLocalDpi xmlns:a14="http://schemas.microsoft.com/office/drawing/2010/main" val="0"/>

</xml_diff>